<commit_message>
design-contracts.md: polishing From Diagrams To ErgoScript Contracts
</commit_message>
<xml_diff>
--- a/docs/design-contracts/flowcards.pptx
+++ b/docs/design-contracts/flowcards.pptx
@@ -167,7 +167,7 @@
             </a:lvl1pPr>
           </a:lstStyle>
           <a:p>
-            <a:endParaRPr lang="ru-RU" dirty="0"/>
+            <a:endParaRPr lang="ru-RU"/>
           </a:p>
         </p:txBody>
       </p:sp>
@@ -200,9 +200,9 @@
           <a:p>
             <a:fld id="{87C75E5E-BF34-6940-99AB-4C69652869D8}" type="datetimeFigureOut">
               <a:rPr lang="ru-RU" smtClean="0"/>
-              <a:t>05.03.2020</a:t>
+              <a:t>27.04.2020</a:t>
             </a:fld>
-            <a:endParaRPr lang="ru-RU" dirty="0"/>
+            <a:endParaRPr lang="ru-RU"/>
           </a:p>
         </p:txBody>
       </p:sp>
@@ -235,7 +235,7 @@
           <a:bodyPr vert="horz" lIns="91440" tIns="45720" rIns="91440" bIns="45720" rtlCol="0" anchor="ctr"/>
           <a:lstStyle/>
           <a:p>
-            <a:endParaRPr lang="ru-RU" dirty="0"/>
+            <a:endParaRPr lang="ru-RU"/>
           </a:p>
         </p:txBody>
       </p:sp>
@@ -326,7 +326,7 @@
             </a:lvl1pPr>
           </a:lstStyle>
           <a:p>
-            <a:endParaRPr lang="ru-RU" dirty="0"/>
+            <a:endParaRPr lang="ru-RU"/>
           </a:p>
         </p:txBody>
       </p:sp>
@@ -361,7 +361,7 @@
               <a:rPr lang="ru-RU" smtClean="0"/>
               <a:t>‹#›</a:t>
             </a:fld>
-            <a:endParaRPr lang="ru-RU" dirty="0"/>
+            <a:endParaRPr lang="ru-RU"/>
           </a:p>
         </p:txBody>
       </p:sp>
@@ -851,9 +851,9 @@
           <a:p>
             <a:fld id="{23365C1A-5167-0B42-B555-56108E5407D0}" type="datetimeFigureOut">
               <a:rPr lang="ru-RU" smtClean="0"/>
-              <a:t>05.03.2020</a:t>
+              <a:t>27.04.2020</a:t>
             </a:fld>
-            <a:endParaRPr lang="ru-RU" dirty="0"/>
+            <a:endParaRPr lang="ru-RU"/>
           </a:p>
         </p:txBody>
       </p:sp>
@@ -872,7 +872,7 @@
           <a:bodyPr/>
           <a:lstStyle/>
           <a:p>
-            <a:endParaRPr lang="ru-RU" dirty="0"/>
+            <a:endParaRPr lang="ru-RU"/>
           </a:p>
         </p:txBody>
       </p:sp>
@@ -895,7 +895,7 @@
               <a:rPr lang="ru-RU" smtClean="0"/>
               <a:t>‹#›</a:t>
             </a:fld>
-            <a:endParaRPr lang="ru-RU" dirty="0"/>
+            <a:endParaRPr lang="ru-RU"/>
           </a:p>
         </p:txBody>
       </p:sp>
@@ -1021,9 +1021,9 @@
           <a:p>
             <a:fld id="{23365C1A-5167-0B42-B555-56108E5407D0}" type="datetimeFigureOut">
               <a:rPr lang="ru-RU" smtClean="0"/>
-              <a:t>05.03.2020</a:t>
+              <a:t>27.04.2020</a:t>
             </a:fld>
-            <a:endParaRPr lang="ru-RU" dirty="0"/>
+            <a:endParaRPr lang="ru-RU"/>
           </a:p>
         </p:txBody>
       </p:sp>
@@ -1042,7 +1042,7 @@
           <a:bodyPr/>
           <a:lstStyle/>
           <a:p>
-            <a:endParaRPr lang="ru-RU" dirty="0"/>
+            <a:endParaRPr lang="ru-RU"/>
           </a:p>
         </p:txBody>
       </p:sp>
@@ -1065,7 +1065,7 @@
               <a:rPr lang="ru-RU" smtClean="0"/>
               <a:t>‹#›</a:t>
             </a:fld>
-            <a:endParaRPr lang="ru-RU" dirty="0"/>
+            <a:endParaRPr lang="ru-RU"/>
           </a:p>
         </p:txBody>
       </p:sp>
@@ -1201,9 +1201,9 @@
           <a:p>
             <a:fld id="{23365C1A-5167-0B42-B555-56108E5407D0}" type="datetimeFigureOut">
               <a:rPr lang="ru-RU" smtClean="0"/>
-              <a:t>05.03.2020</a:t>
+              <a:t>27.04.2020</a:t>
             </a:fld>
-            <a:endParaRPr lang="ru-RU" dirty="0"/>
+            <a:endParaRPr lang="ru-RU"/>
           </a:p>
         </p:txBody>
       </p:sp>
@@ -1222,7 +1222,7 @@
           <a:bodyPr/>
           <a:lstStyle/>
           <a:p>
-            <a:endParaRPr lang="ru-RU" dirty="0"/>
+            <a:endParaRPr lang="ru-RU"/>
           </a:p>
         </p:txBody>
       </p:sp>
@@ -1245,7 +1245,7 @@
               <a:rPr lang="ru-RU" smtClean="0"/>
               <a:t>‹#›</a:t>
             </a:fld>
-            <a:endParaRPr lang="ru-RU" dirty="0"/>
+            <a:endParaRPr lang="ru-RU"/>
           </a:p>
         </p:txBody>
       </p:sp>
@@ -1371,9 +1371,9 @@
           <a:p>
             <a:fld id="{23365C1A-5167-0B42-B555-56108E5407D0}" type="datetimeFigureOut">
               <a:rPr lang="ru-RU" smtClean="0"/>
-              <a:t>05.03.2020</a:t>
+              <a:t>27.04.2020</a:t>
             </a:fld>
-            <a:endParaRPr lang="ru-RU" dirty="0"/>
+            <a:endParaRPr lang="ru-RU"/>
           </a:p>
         </p:txBody>
       </p:sp>
@@ -1392,7 +1392,7 @@
           <a:bodyPr/>
           <a:lstStyle/>
           <a:p>
-            <a:endParaRPr lang="ru-RU" dirty="0"/>
+            <a:endParaRPr lang="ru-RU"/>
           </a:p>
         </p:txBody>
       </p:sp>
@@ -1415,7 +1415,7 @@
               <a:rPr lang="ru-RU" smtClean="0"/>
               <a:t>‹#›</a:t>
             </a:fld>
-            <a:endParaRPr lang="ru-RU" dirty="0"/>
+            <a:endParaRPr lang="ru-RU"/>
           </a:p>
         </p:txBody>
       </p:sp>
@@ -1615,9 +1615,9 @@
           <a:p>
             <a:fld id="{23365C1A-5167-0B42-B555-56108E5407D0}" type="datetimeFigureOut">
               <a:rPr lang="ru-RU" smtClean="0"/>
-              <a:t>05.03.2020</a:t>
+              <a:t>27.04.2020</a:t>
             </a:fld>
-            <a:endParaRPr lang="ru-RU" dirty="0"/>
+            <a:endParaRPr lang="ru-RU"/>
           </a:p>
         </p:txBody>
       </p:sp>
@@ -1636,7 +1636,7 @@
           <a:bodyPr/>
           <a:lstStyle/>
           <a:p>
-            <a:endParaRPr lang="ru-RU" dirty="0"/>
+            <a:endParaRPr lang="ru-RU"/>
           </a:p>
         </p:txBody>
       </p:sp>
@@ -1659,7 +1659,7 @@
               <a:rPr lang="ru-RU" smtClean="0"/>
               <a:t>‹#›</a:t>
             </a:fld>
-            <a:endParaRPr lang="ru-RU" dirty="0"/>
+            <a:endParaRPr lang="ru-RU"/>
           </a:p>
         </p:txBody>
       </p:sp>
@@ -1847,9 +1847,9 @@
           <a:p>
             <a:fld id="{23365C1A-5167-0B42-B555-56108E5407D0}" type="datetimeFigureOut">
               <a:rPr lang="ru-RU" smtClean="0"/>
-              <a:t>05.03.2020</a:t>
+              <a:t>27.04.2020</a:t>
             </a:fld>
-            <a:endParaRPr lang="ru-RU" dirty="0"/>
+            <a:endParaRPr lang="ru-RU"/>
           </a:p>
         </p:txBody>
       </p:sp>
@@ -1868,7 +1868,7 @@
           <a:bodyPr/>
           <a:lstStyle/>
           <a:p>
-            <a:endParaRPr lang="ru-RU" dirty="0"/>
+            <a:endParaRPr lang="ru-RU"/>
           </a:p>
         </p:txBody>
       </p:sp>
@@ -1891,7 +1891,7 @@
               <a:rPr lang="ru-RU" smtClean="0"/>
               <a:t>‹#›</a:t>
             </a:fld>
-            <a:endParaRPr lang="ru-RU" dirty="0"/>
+            <a:endParaRPr lang="ru-RU"/>
           </a:p>
         </p:txBody>
       </p:sp>
@@ -2214,9 +2214,9 @@
           <a:p>
             <a:fld id="{23365C1A-5167-0B42-B555-56108E5407D0}" type="datetimeFigureOut">
               <a:rPr lang="ru-RU" smtClean="0"/>
-              <a:t>05.03.2020</a:t>
+              <a:t>27.04.2020</a:t>
             </a:fld>
-            <a:endParaRPr lang="ru-RU" dirty="0"/>
+            <a:endParaRPr lang="ru-RU"/>
           </a:p>
         </p:txBody>
       </p:sp>
@@ -2235,7 +2235,7 @@
           <a:bodyPr/>
           <a:lstStyle/>
           <a:p>
-            <a:endParaRPr lang="ru-RU" dirty="0"/>
+            <a:endParaRPr lang="ru-RU"/>
           </a:p>
         </p:txBody>
       </p:sp>
@@ -2258,7 +2258,7 @@
               <a:rPr lang="ru-RU" smtClean="0"/>
               <a:t>‹#›</a:t>
             </a:fld>
-            <a:endParaRPr lang="ru-RU" dirty="0"/>
+            <a:endParaRPr lang="ru-RU"/>
           </a:p>
         </p:txBody>
       </p:sp>
@@ -2332,9 +2332,9 @@
           <a:p>
             <a:fld id="{23365C1A-5167-0B42-B555-56108E5407D0}" type="datetimeFigureOut">
               <a:rPr lang="ru-RU" smtClean="0"/>
-              <a:t>05.03.2020</a:t>
+              <a:t>27.04.2020</a:t>
             </a:fld>
-            <a:endParaRPr lang="ru-RU" dirty="0"/>
+            <a:endParaRPr lang="ru-RU"/>
           </a:p>
         </p:txBody>
       </p:sp>
@@ -2353,7 +2353,7 @@
           <a:bodyPr/>
           <a:lstStyle/>
           <a:p>
-            <a:endParaRPr lang="ru-RU" dirty="0"/>
+            <a:endParaRPr lang="ru-RU"/>
           </a:p>
         </p:txBody>
       </p:sp>
@@ -2376,7 +2376,7 @@
               <a:rPr lang="ru-RU" smtClean="0"/>
               <a:t>‹#›</a:t>
             </a:fld>
-            <a:endParaRPr lang="ru-RU" dirty="0"/>
+            <a:endParaRPr lang="ru-RU"/>
           </a:p>
         </p:txBody>
       </p:sp>
@@ -2427,9 +2427,9 @@
           <a:p>
             <a:fld id="{23365C1A-5167-0B42-B555-56108E5407D0}" type="datetimeFigureOut">
               <a:rPr lang="ru-RU" smtClean="0"/>
-              <a:t>05.03.2020</a:t>
+              <a:t>27.04.2020</a:t>
             </a:fld>
-            <a:endParaRPr lang="ru-RU" dirty="0"/>
+            <a:endParaRPr lang="ru-RU"/>
           </a:p>
         </p:txBody>
       </p:sp>
@@ -2448,7 +2448,7 @@
           <a:bodyPr/>
           <a:lstStyle/>
           <a:p>
-            <a:endParaRPr lang="ru-RU" dirty="0"/>
+            <a:endParaRPr lang="ru-RU"/>
           </a:p>
         </p:txBody>
       </p:sp>
@@ -2471,7 +2471,7 @@
               <a:rPr lang="ru-RU" smtClean="0"/>
               <a:t>‹#›</a:t>
             </a:fld>
-            <a:endParaRPr lang="ru-RU" dirty="0"/>
+            <a:endParaRPr lang="ru-RU"/>
           </a:p>
         </p:txBody>
       </p:sp>
@@ -2704,9 +2704,9 @@
           <a:p>
             <a:fld id="{23365C1A-5167-0B42-B555-56108E5407D0}" type="datetimeFigureOut">
               <a:rPr lang="ru-RU" smtClean="0"/>
-              <a:t>05.03.2020</a:t>
+              <a:t>27.04.2020</a:t>
             </a:fld>
-            <a:endParaRPr lang="ru-RU" dirty="0"/>
+            <a:endParaRPr lang="ru-RU"/>
           </a:p>
         </p:txBody>
       </p:sp>
@@ -2725,7 +2725,7 @@
           <a:bodyPr/>
           <a:lstStyle/>
           <a:p>
-            <a:endParaRPr lang="ru-RU" dirty="0"/>
+            <a:endParaRPr lang="ru-RU"/>
           </a:p>
         </p:txBody>
       </p:sp>
@@ -2748,7 +2748,7 @@
               <a:rPr lang="ru-RU" smtClean="0"/>
               <a:t>‹#›</a:t>
             </a:fld>
-            <a:endParaRPr lang="ru-RU" dirty="0"/>
+            <a:endParaRPr lang="ru-RU"/>
           </a:p>
         </p:txBody>
       </p:sp>
@@ -2872,7 +2872,7 @@
           </a:lstStyle>
           <a:p>
             <a:r>
-              <a:rPr lang="en-US" dirty="0"/>
+              <a:rPr lang="en-US"/>
               <a:t>Click icon to add picture</a:t>
             </a:r>
           </a:p>
@@ -2960,9 +2960,9 @@
           <a:p>
             <a:fld id="{23365C1A-5167-0B42-B555-56108E5407D0}" type="datetimeFigureOut">
               <a:rPr lang="ru-RU" smtClean="0"/>
-              <a:t>05.03.2020</a:t>
+              <a:t>27.04.2020</a:t>
             </a:fld>
-            <a:endParaRPr lang="ru-RU" dirty="0"/>
+            <a:endParaRPr lang="ru-RU"/>
           </a:p>
         </p:txBody>
       </p:sp>
@@ -2981,7 +2981,7 @@
           <a:bodyPr/>
           <a:lstStyle/>
           <a:p>
-            <a:endParaRPr lang="ru-RU" dirty="0"/>
+            <a:endParaRPr lang="ru-RU"/>
           </a:p>
         </p:txBody>
       </p:sp>
@@ -3004,7 +3004,7 @@
               <a:rPr lang="ru-RU" smtClean="0"/>
               <a:t>‹#›</a:t>
             </a:fld>
-            <a:endParaRPr lang="ru-RU" dirty="0"/>
+            <a:endParaRPr lang="ru-RU"/>
           </a:p>
         </p:txBody>
       </p:sp>
@@ -3173,9 +3173,9 @@
           <a:p>
             <a:fld id="{23365C1A-5167-0B42-B555-56108E5407D0}" type="datetimeFigureOut">
               <a:rPr lang="ru-RU" smtClean="0"/>
-              <a:t>05.03.2020</a:t>
+              <a:t>27.04.2020</a:t>
             </a:fld>
-            <a:endParaRPr lang="ru-RU" dirty="0"/>
+            <a:endParaRPr lang="ru-RU"/>
           </a:p>
         </p:txBody>
       </p:sp>
@@ -3212,7 +3212,7 @@
             </a:lvl1pPr>
           </a:lstStyle>
           <a:p>
-            <a:endParaRPr lang="ru-RU" dirty="0"/>
+            <a:endParaRPr lang="ru-RU"/>
           </a:p>
         </p:txBody>
       </p:sp>
@@ -3253,7 +3253,7 @@
               <a:rPr lang="ru-RU" smtClean="0"/>
               <a:t>‹#›</a:t>
             </a:fld>
-            <a:endParaRPr lang="ru-RU" dirty="0"/>
+            <a:endParaRPr lang="ru-RU"/>
           </a:p>
         </p:txBody>
       </p:sp>
@@ -3603,7 +3603,7 @@
               <a:rPr lang="en-US" dirty="0" err="1"/>
               <a:t>FlowCards</a:t>
             </a:r>
-            <a:endParaRPr lang="ru-RU" dirty="0"/>
+            <a:endParaRPr lang="ru-RU"/>
           </a:p>
         </p:txBody>
       </p:sp>
@@ -3629,25 +3629,25 @@
           <a:lstStyle/>
           <a:p>
             <a:r>
-              <a:rPr lang="en-US" dirty="0"/>
+              <a:rPr lang="en-US"/>
               <a:t>Alexander </a:t>
             </a:r>
             <a:r>
-              <a:rPr lang="en-US" dirty="0" err="1"/>
+              <a:rPr lang="en-US" err="1"/>
               <a:t>Slesarenko</a:t>
             </a:r>
-            <a:endParaRPr lang="ru-RU" dirty="0"/>
-          </a:p>
-          <a:p>
-            <a:r>
-              <a:rPr lang="en-US" dirty="0"/>
+            <a:endParaRPr lang="ru-RU"/>
+          </a:p>
+          <a:p>
+            <a:r>
+              <a:rPr lang="en-US"/>
               <a:t>@</a:t>
             </a:r>
             <a:r>
-              <a:rPr lang="en-US" dirty="0" err="1"/>
+              <a:rPr lang="en-US" err="1"/>
               <a:t>aslesarenko</a:t>
             </a:r>
-            <a:endParaRPr lang="ru-RU" dirty="0"/>
+            <a:endParaRPr lang="ru-RU"/>
           </a:p>
         </p:txBody>
       </p:sp>
@@ -3739,7 +3739,7 @@
           <a:p>
             <a:pPr algn="ctr"/>
             <a:r>
-              <a:rPr lang="en-RU" sz="900" dirty="0">
+              <a:rPr lang="en-RU" sz="900" noProof="1">
                 <a:solidFill>
                   <a:schemeClr val="tx1">
                     <a:lumMod val="75000"/>
@@ -3913,22 +3913,14 @@
           <a:p>
             <a:pPr algn="ctr"/>
             <a:r>
-              <a:rPr lang="en-US" dirty="0">
+              <a:rPr lang="en-US" noProof="1">
                 <a:solidFill>
                   <a:srgbClr val="FF5537"/>
                 </a:solidFill>
               </a:rPr>
-              <a:t>Anatomy of </a:t>
-            </a:r>
-            <a:r>
-              <a:rPr lang="en-US" dirty="0" err="1">
-                <a:solidFill>
-                  <a:srgbClr val="FF5537"/>
-                </a:solidFill>
-              </a:rPr>
-              <a:t>FlowCard</a:t>
-            </a:r>
-            <a:endParaRPr lang="ru-RU" dirty="0">
+              <a:t>Anatomy of FlowCard</a:t>
+            </a:r>
+            <a:endParaRPr lang="ru-RU" noProof="1">
               <a:solidFill>
                 <a:srgbClr val="FF5537"/>
               </a:solidFill>
@@ -5028,11 +5020,11 @@
           <a:lstStyle/>
           <a:p>
             <a:r>
-              <a:rPr lang="en-GB" sz="1200" dirty="0"/>
+              <a:rPr lang="en-GB" sz="1200" noProof="1"/>
               <a:t>t</a:t>
             </a:r>
             <a:r>
-              <a:rPr lang="en-RU" sz="1200" dirty="0"/>
+              <a:rPr lang="en-RU" sz="1200" noProof="1"/>
               <a:t>x outputs with assigned indexes</a:t>
             </a:r>
           </a:p>
@@ -5165,11 +5157,11 @@
           <a:lstStyle/>
           <a:p>
             <a:r>
-              <a:rPr lang="en-GB" sz="1200" dirty="0"/>
+              <a:rPr lang="en-GB" sz="1200" noProof="1"/>
               <a:t>t</a:t>
             </a:r>
             <a:r>
-              <a:rPr lang="en-RU" sz="1200" dirty="0"/>
+              <a:rPr lang="en-RU" sz="1200" noProof="1"/>
               <a:t>x inputs</a:t>
             </a:r>
           </a:p>
@@ -5304,7 +5296,7 @@
           <a:lstStyle/>
           <a:p>
             <a:r>
-              <a:rPr lang="en-RU" sz="1200" dirty="0"/>
+              <a:rPr lang="en-RU" sz="1200" noProof="1"/>
               <a:t>transaction</a:t>
             </a:r>
           </a:p>
@@ -5388,10 +5380,10 @@
           <a:lstStyle/>
           <a:p>
             <a:r>
-              <a:rPr lang="en-GB" sz="1200" dirty="0"/>
+              <a:rPr lang="en-GB" sz="1200" noProof="1"/>
               <a:t>Box name</a:t>
             </a:r>
-            <a:endParaRPr lang="en-RU" sz="1200" dirty="0"/>
+            <a:endParaRPr lang="en-RU" sz="1200" noProof="1"/>
           </a:p>
         </p:txBody>
       </p:sp>
@@ -5473,10 +5465,10 @@
           <a:lstStyle/>
           <a:p>
             <a:r>
-              <a:rPr lang="en-US" sz="1200" dirty="0"/>
+              <a:rPr lang="en-US" sz="1200" noProof="1"/>
               <a:t>Boxes in the wallet</a:t>
             </a:r>
-            <a:endParaRPr lang="en-RU" sz="1200" dirty="0"/>
+            <a:endParaRPr lang="en-RU" sz="1200" noProof="1"/>
           </a:p>
         </p:txBody>
       </p:sp>
@@ -5608,11 +5600,11 @@
           <a:lstStyle/>
           <a:p>
             <a:r>
-              <a:rPr lang="en-GB" sz="1200" dirty="0"/>
+              <a:rPr lang="en-GB" sz="1200" noProof="1"/>
               <a:t>c</a:t>
             </a:r>
             <a:r>
-              <a:rPr lang="en-RU" sz="1200" dirty="0"/>
+              <a:rPr lang="en-RU" sz="1200" noProof="1"/>
               <a:t>ontract wallet</a:t>
             </a:r>
           </a:p>
@@ -5695,10 +5687,10 @@
           <a:lstStyle/>
           <a:p>
             <a:r>
-              <a:rPr lang="en-GB" sz="1200" dirty="0"/>
+              <a:rPr lang="en-GB" sz="1200" noProof="1"/>
               <a:t>Amount of ERGs in the box</a:t>
             </a:r>
-            <a:endParaRPr lang="en-RU" sz="1200" dirty="0"/>
+            <a:endParaRPr lang="en-RU" sz="1200" noProof="1"/>
           </a:p>
         </p:txBody>
       </p:sp>
@@ -5780,10 +5772,10 @@
           <a:lstStyle/>
           <a:p>
             <a:r>
-              <a:rPr lang="en-GB" sz="1200" dirty="0"/>
+              <a:rPr lang="en-GB" sz="1200" noProof="1"/>
               <a:t>Amount of T token</a:t>
             </a:r>
-            <a:endParaRPr lang="en-RU" sz="1200" dirty="0"/>
+            <a:endParaRPr lang="en-RU" sz="1200" noProof="1"/>
           </a:p>
         </p:txBody>
       </p:sp>
@@ -5894,7 +5886,7 @@
           <a:p>
             <a:pPr algn="ctr"/>
             <a:r>
-              <a:rPr lang="en-RU" sz="1100" dirty="0">
+              <a:rPr lang="en-RU" sz="1100" noProof="1">
                 <a:solidFill>
                   <a:schemeClr val="tx1">
                     <a:lumMod val="75000"/>
@@ -5936,11 +5928,11 @@
           <a:lstStyle/>
           <a:p>
             <a:r>
-              <a:rPr lang="en-GB" sz="1200" dirty="0"/>
+              <a:rPr lang="en-GB" sz="1200" noProof="1"/>
               <a:t>C</a:t>
             </a:r>
             <a:r>
-              <a:rPr lang="en-RU" sz="1200" dirty="0"/>
+              <a:rPr lang="en-RU" sz="1200" noProof="1"/>
               <a:t>ontract </a:t>
             </a:r>
           </a:p>
@@ -6052,7 +6044,7 @@
           <a:p>
             <a:pPr algn="ctr"/>
             <a:r>
-              <a:rPr lang="en-RU" sz="1100" dirty="0">
+              <a:rPr lang="en-RU" sz="1100" noProof="1">
                 <a:solidFill>
                   <a:schemeClr val="tx1">
                     <a:lumMod val="75000"/>
@@ -6123,7 +6115,7 @@
           <a:p>
             <a:pPr algn="ctr"/>
             <a:r>
-              <a:rPr lang="en-RU" sz="1100" dirty="0">
+              <a:rPr lang="en-RU" sz="1100" noProof="1">
                 <a:solidFill>
                   <a:schemeClr val="tx1">
                     <a:lumMod val="75000"/>
@@ -6194,7 +6186,7 @@
           <a:p>
             <a:pPr algn="ctr"/>
             <a:r>
-              <a:rPr lang="en-RU" sz="1100" dirty="0">
+              <a:rPr lang="en-RU" sz="1100" noProof="1">
                 <a:solidFill>
                   <a:schemeClr val="tx1">
                     <a:lumMod val="75000"/>
@@ -6265,7 +6257,7 @@
           <a:p>
             <a:pPr algn="ctr"/>
             <a:r>
-              <a:rPr lang="en-RU" sz="1100" dirty="0">
+              <a:rPr lang="en-RU" sz="1100" noProof="1">
                 <a:solidFill>
                   <a:schemeClr val="tx1">
                     <a:lumMod val="75000"/>
@@ -6336,7 +6328,7 @@
           <a:p>
             <a:pPr algn="ctr"/>
             <a:r>
-              <a:rPr lang="en-RU" sz="1100" dirty="0">
+              <a:rPr lang="en-RU" sz="1100" noProof="1">
                 <a:solidFill>
                   <a:schemeClr val="tx1">
                     <a:lumMod val="75000"/>
@@ -6407,7 +6399,7 @@
           <a:p>
             <a:pPr algn="ctr"/>
             <a:r>
-              <a:rPr lang="en-RU" sz="1100" dirty="0">
+              <a:rPr lang="en-RU" sz="1100" noProof="1">
                 <a:solidFill>
                   <a:schemeClr val="tx1">
                     <a:lumMod val="75000"/>
@@ -6478,7 +6470,7 @@
           <a:p>
             <a:pPr algn="ctr"/>
             <a:r>
-              <a:rPr lang="en-RU" sz="1100" dirty="0">
+              <a:rPr lang="en-RU" sz="1100" noProof="1">
                 <a:solidFill>
                   <a:schemeClr val="tx1">
                     <a:lumMod val="75000"/>
@@ -6624,7 +6616,7 @@
           <a:lstStyle/>
           <a:p>
             <a:r>
-              <a:rPr lang="en-RU" sz="1200" dirty="0"/>
+              <a:rPr lang="en-RU" sz="1200" noProof="1"/>
               <a:t> Name and parameters</a:t>
             </a:r>
           </a:p>
@@ -6688,7 +6680,7 @@
           <a:p>
             <a:pPr algn="ctr"/>
             <a:r>
-              <a:rPr lang="en-RU" sz="1100" dirty="0">
+              <a:rPr lang="en-RU" sz="1100" noProof="1">
                 <a:solidFill>
                   <a:schemeClr val="tx1">
                     <a:lumMod val="75000"/>
@@ -8296,7 +8288,7 @@
         </p:nvSpPr>
         <p:spPr>
           <a:xfrm>
-            <a:off x="4602485" y="1247026"/>
+            <a:off x="4602485" y="1359916"/>
             <a:ext cx="1317253" cy="1433415"/>
           </a:xfrm>
           <a:prstGeom prst="roundRect">
@@ -8352,7 +8344,7 @@
         </p:nvSpPr>
         <p:spPr>
           <a:xfrm>
-            <a:off x="3140571" y="1240065"/>
+            <a:off x="3140571" y="1352955"/>
             <a:ext cx="1317253" cy="1433415"/>
           </a:xfrm>
           <a:prstGeom prst="roundRect">
@@ -8408,8 +8400,8 @@
         </p:nvSpPr>
         <p:spPr>
           <a:xfrm>
-            <a:off x="7436020" y="962860"/>
-            <a:ext cx="1545042" cy="3104165"/>
+            <a:off x="7258942" y="1075750"/>
+            <a:ext cx="1722120" cy="3104165"/>
           </a:xfrm>
           <a:prstGeom prst="roundRect">
             <a:avLst>
@@ -8466,7 +8458,7 @@
         </p:nvSpPr>
         <p:spPr>
           <a:xfrm>
-            <a:off x="1494340" y="563225"/>
+            <a:off x="1524825" y="66151"/>
             <a:ext cx="6155320" cy="514558"/>
           </a:xfrm>
           <a:prstGeom prst="rect">
@@ -8502,7 +8494,7 @@
           <a:p>
             <a:r>
               <a:rPr lang="en-US" sz="2800" noProof="1"/>
-              <a:t>DEX matching (simplified)</a:t>
+              <a:t>DEX dApp FlowCard Diagram</a:t>
             </a:r>
             <a:endParaRPr lang="ru-RU" sz="2800" noProof="1"/>
           </a:p>
@@ -8522,8 +8514,8 @@
         </p:nvSpPr>
         <p:spPr>
           <a:xfrm>
-            <a:off x="7582743" y="2077315"/>
-            <a:ext cx="1210158" cy="361986"/>
+            <a:off x="7402119" y="2190205"/>
+            <a:ext cx="1365292" cy="361986"/>
           </a:xfrm>
           <a:prstGeom prst="roundRect">
             <a:avLst/>
@@ -8598,7 +8590,7 @@
         </p:nvSpPr>
         <p:spPr>
           <a:xfrm>
-            <a:off x="7436020" y="654362"/>
+            <a:off x="7436020" y="767252"/>
             <a:ext cx="1344342" cy="369332"/>
           </a:xfrm>
           <a:prstGeom prst="rect">
@@ -8634,8 +8626,8 @@
         </p:nvSpPr>
         <p:spPr>
           <a:xfrm>
-            <a:off x="7572434" y="2659423"/>
-            <a:ext cx="1230775" cy="361986"/>
+            <a:off x="7391810" y="2772313"/>
+            <a:ext cx="1388552" cy="361986"/>
           </a:xfrm>
           <a:prstGeom prst="roundRect">
             <a:avLst/>
@@ -8710,7 +8702,7 @@
         </p:nvSpPr>
         <p:spPr>
           <a:xfrm>
-            <a:off x="1980391" y="2031622"/>
+            <a:off x="2036836" y="2144512"/>
             <a:ext cx="896646" cy="465149"/>
           </a:xfrm>
           <a:prstGeom prst="rect">
@@ -8775,14 +8767,13 @@
           <p:cNvCxnSpPr>
             <a:cxnSpLocks/>
             <a:stCxn id="85" idx="3"/>
-            <a:endCxn id="38" idx="1"/>
           </p:cNvCxnSpPr>
           <p:nvPr/>
         </p:nvCxnSpPr>
         <p:spPr>
           <a:xfrm flipV="1">
-            <a:off x="1554977" y="2264197"/>
-            <a:ext cx="425414" cy="2269"/>
+            <a:off x="1707463" y="2377087"/>
+            <a:ext cx="250350" cy="2269"/>
           </a:xfrm>
           <a:prstGeom prst="bentConnector3">
             <a:avLst>
@@ -8831,8 +8822,8 @@
         </p:nvCxnSpPr>
         <p:spPr>
           <a:xfrm rot="5400000">
-            <a:off x="1857226" y="2188735"/>
-            <a:ext cx="263452" cy="879525"/>
+            <a:off x="1961691" y="2349645"/>
+            <a:ext cx="263452" cy="783484"/>
           </a:xfrm>
           <a:prstGeom prst="bentConnector2">
             <a:avLst/>
@@ -8876,7 +8867,7 @@
         </p:nvSpPr>
         <p:spPr>
           <a:xfrm>
-            <a:off x="3280039" y="2072811"/>
+            <a:off x="3280039" y="2185701"/>
             <a:ext cx="1060181" cy="377746"/>
           </a:xfrm>
           <a:prstGeom prst="roundRect">
@@ -8939,7 +8930,7 @@
         </p:nvSpPr>
         <p:spPr>
           <a:xfrm>
-            <a:off x="4580816" y="1200837"/>
+            <a:off x="4580816" y="1313727"/>
             <a:ext cx="948080" cy="338554"/>
           </a:xfrm>
           <a:prstGeom prst="rect">
@@ -8993,8 +8984,8 @@
         </p:nvCxnSpPr>
         <p:spPr>
           <a:xfrm flipV="1">
-            <a:off x="2877037" y="2261684"/>
-            <a:ext cx="403002" cy="2513"/>
+            <a:off x="2933482" y="2374574"/>
+            <a:ext cx="346557" cy="2513"/>
           </a:xfrm>
           <a:prstGeom prst="bentConnector3">
             <a:avLst>
@@ -9044,7 +9035,7 @@
         </p:nvCxnSpPr>
         <p:spPr>
           <a:xfrm rot="16200000" flipH="1">
-            <a:off x="3733571" y="2527115"/>
+            <a:off x="3733571" y="2640005"/>
             <a:ext cx="861872" cy="708755"/>
           </a:xfrm>
           <a:prstGeom prst="bentConnector3">
@@ -9090,8 +9081,8 @@
         </p:nvSpPr>
         <p:spPr>
           <a:xfrm>
-            <a:off x="143622" y="976889"/>
-            <a:ext cx="1541792" cy="3089211"/>
+            <a:off x="143622" y="1089779"/>
+            <a:ext cx="1691416" cy="3089211"/>
           </a:xfrm>
           <a:prstGeom prst="roundRect">
             <a:avLst>
@@ -9146,8 +9137,8 @@
         </p:nvSpPr>
         <p:spPr>
           <a:xfrm>
-            <a:off x="256737" y="3161754"/>
-            <a:ext cx="1330161" cy="761903"/>
+            <a:off x="234159" y="3274644"/>
+            <a:ext cx="1516733" cy="761903"/>
           </a:xfrm>
           <a:prstGeom prst="roundRect">
             <a:avLst/>
@@ -9273,7 +9264,7 @@
                   </a:schemeClr>
                 </a:solidFill>
               </a:rPr>
-              <a:t>bid ? @contract</a:t>
+              <a:t>bid ? script == buyer</a:t>
             </a:r>
             <a:endParaRPr lang="ru-RU" sz="1200" noProof="1">
               <a:solidFill>
@@ -9300,7 +9291,7 @@
         </p:nvSpPr>
         <p:spPr>
           <a:xfrm>
-            <a:off x="189438" y="663719"/>
+            <a:off x="189438" y="776609"/>
             <a:ext cx="1427699" cy="369332"/>
           </a:xfrm>
           <a:prstGeom prst="rect">
@@ -9336,8 +9327,8 @@
         </p:nvSpPr>
         <p:spPr>
           <a:xfrm>
-            <a:off x="7557102" y="3279274"/>
-            <a:ext cx="1323881" cy="533042"/>
+            <a:off x="7376478" y="3392164"/>
+            <a:ext cx="1489764" cy="533042"/>
           </a:xfrm>
           <a:prstGeom prst="roundRect">
             <a:avLst/>
@@ -9380,7 +9371,7 @@
                   </a:schemeClr>
                 </a:solidFill>
               </a:rPr>
-              <a:t>ask ? ergAmt</a:t>
+              <a:t>ask ? ergAmt: ERG</a:t>
             </a:r>
           </a:p>
           <a:p>
@@ -9428,7 +9419,7 @@
                   </a:schemeClr>
                 </a:solidFill>
               </a:rPr>
-              <a:t>ask ? @contract </a:t>
+              <a:t>ask ? script == seller </a:t>
             </a:r>
             <a:endParaRPr lang="ru-RU" sz="1200" noProof="1">
               <a:solidFill>
@@ -9455,7 +9446,7 @@
         </p:nvSpPr>
         <p:spPr>
           <a:xfrm>
-            <a:off x="3249019" y="1848188"/>
+            <a:off x="3249019" y="1961078"/>
             <a:ext cx="639919" cy="261610"/>
           </a:xfrm>
           <a:prstGeom prst="rect">
@@ -9506,8 +9497,8 @@
         </p:nvCxnSpPr>
         <p:spPr>
           <a:xfrm rot="10800000" flipV="1">
-            <a:off x="5799439" y="2260199"/>
-            <a:ext cx="415276" cy="271"/>
+            <a:off x="5799440" y="2373089"/>
+            <a:ext cx="336253" cy="271"/>
           </a:xfrm>
           <a:prstGeom prst="bentConnector3">
             <a:avLst>
@@ -9557,8 +9548,8 @@
         </p:nvCxnSpPr>
         <p:spPr>
           <a:xfrm>
-            <a:off x="5003866" y="3543249"/>
-            <a:ext cx="2553236" cy="2546"/>
+            <a:off x="5003866" y="3656139"/>
+            <a:ext cx="2372612" cy="2546"/>
           </a:xfrm>
           <a:prstGeom prst="bentConnector3">
             <a:avLst>
@@ -9604,8 +9595,8 @@
         </p:nvSpPr>
         <p:spPr>
           <a:xfrm>
-            <a:off x="306863" y="2131838"/>
-            <a:ext cx="1248114" cy="269256"/>
+            <a:off x="284285" y="2244728"/>
+            <a:ext cx="1423178" cy="269256"/>
           </a:xfrm>
           <a:prstGeom prst="roundRect">
             <a:avLst/>
@@ -9671,8 +9662,8 @@
         </p:nvCxnSpPr>
         <p:spPr>
           <a:xfrm rot="10800000" flipV="1">
-            <a:off x="7111361" y="2258308"/>
-            <a:ext cx="471382" cy="1892"/>
+            <a:off x="7032339" y="2371198"/>
+            <a:ext cx="369781" cy="1892"/>
           </a:xfrm>
           <a:prstGeom prst="bentConnector3">
             <a:avLst>
@@ -9717,8 +9708,8 @@
         </p:nvSpPr>
         <p:spPr>
           <a:xfrm>
-            <a:off x="301075" y="2626509"/>
-            <a:ext cx="1248114" cy="267428"/>
+            <a:off x="278497" y="2739399"/>
+            <a:ext cx="1423178" cy="267428"/>
           </a:xfrm>
           <a:prstGeom prst="roundRect">
             <a:avLst/>
@@ -9784,8 +9775,8 @@
         </p:nvCxnSpPr>
         <p:spPr>
           <a:xfrm rot="16200000" flipH="1">
-            <a:off x="6943038" y="2211019"/>
-            <a:ext cx="349397" cy="909396"/>
+            <a:off x="6813214" y="2374709"/>
+            <a:ext cx="349397" cy="807795"/>
           </a:xfrm>
           <a:prstGeom prst="bentConnector2">
             <a:avLst/>
@@ -9829,7 +9820,7 @@
         </p:nvSpPr>
         <p:spPr>
           <a:xfrm>
-            <a:off x="5046203" y="3250848"/>
+            <a:off x="5046203" y="3363738"/>
             <a:ext cx="436338" cy="523220"/>
           </a:xfrm>
           <a:prstGeom prst="rect">
@@ -9868,7 +9859,7 @@
         </p:nvSpPr>
         <p:spPr>
           <a:xfrm>
-            <a:off x="2932109" y="3250848"/>
+            <a:off x="2932109" y="3363738"/>
             <a:ext cx="1131464" cy="307777"/>
           </a:xfrm>
           <a:prstGeom prst="rect">
@@ -9904,7 +9895,7 @@
         </p:nvSpPr>
         <p:spPr>
           <a:xfrm>
-            <a:off x="4739258" y="2070384"/>
+            <a:off x="4739258" y="2183274"/>
             <a:ext cx="1060181" cy="380173"/>
           </a:xfrm>
           <a:prstGeom prst="roundRect">
@@ -9980,7 +9971,7 @@
         </p:nvSpPr>
         <p:spPr>
           <a:xfrm>
-            <a:off x="4699740" y="1858101"/>
+            <a:off x="4699740" y="1970991"/>
             <a:ext cx="635110" cy="261610"/>
           </a:xfrm>
           <a:prstGeom prst="rect">
@@ -10027,7 +10018,7 @@
         </p:nvSpPr>
         <p:spPr>
           <a:xfrm>
-            <a:off x="143622" y="940010"/>
+            <a:off x="143622" y="1052900"/>
             <a:ext cx="990079" cy="338554"/>
           </a:xfrm>
           <a:prstGeom prst="rect">
@@ -10077,7 +10068,7 @@
         </p:nvSpPr>
         <p:spPr>
           <a:xfrm>
-            <a:off x="3137184" y="1200837"/>
+            <a:off x="3137184" y="1313727"/>
             <a:ext cx="980140" cy="338554"/>
           </a:xfrm>
           <a:prstGeom prst="rect">
@@ -10127,7 +10118,7 @@
         </p:nvSpPr>
         <p:spPr>
           <a:xfrm>
-            <a:off x="7436020" y="941660"/>
+            <a:off x="7436020" y="1054550"/>
             <a:ext cx="960519" cy="338554"/>
           </a:xfrm>
           <a:prstGeom prst="rect">
@@ -10181,7 +10172,7 @@
         </p:nvCxnSpPr>
         <p:spPr>
           <a:xfrm rot="5400000">
-            <a:off x="4463181" y="2506261"/>
+            <a:off x="4463181" y="2619151"/>
             <a:ext cx="861872" cy="750464"/>
           </a:xfrm>
           <a:prstGeom prst="bentConnector3">
@@ -10227,7 +10218,7 @@
         </p:nvSpPr>
         <p:spPr>
           <a:xfrm>
-            <a:off x="4033903" y="3312429"/>
+            <a:off x="4033903" y="3425319"/>
             <a:ext cx="969963" cy="461639"/>
           </a:xfrm>
           <a:prstGeom prst="rect">
@@ -10291,8 +10282,8 @@
         </p:nvCxnSpPr>
         <p:spPr>
           <a:xfrm rot="10800000">
-            <a:off x="1586899" y="3542707"/>
-            <a:ext cx="2447005" cy="543"/>
+            <a:off x="1750893" y="3655597"/>
+            <a:ext cx="2283011" cy="543"/>
           </a:xfrm>
           <a:prstGeom prst="bentConnector3">
             <a:avLst>
@@ -10338,7 +10329,7 @@
         </p:nvSpPr>
         <p:spPr>
           <a:xfrm>
-            <a:off x="5219404" y="2404573"/>
+            <a:off x="5219404" y="2517463"/>
             <a:ext cx="557268" cy="276999"/>
           </a:xfrm>
           <a:prstGeom prst="rect">
@@ -10374,7 +10365,7 @@
         </p:nvSpPr>
         <p:spPr>
           <a:xfrm>
-            <a:off x="3757020" y="2404068"/>
+            <a:off x="3757020" y="2516958"/>
             <a:ext cx="557268" cy="276999"/>
           </a:xfrm>
           <a:prstGeom prst="rect">
@@ -10410,7 +10401,7 @@
         </p:nvSpPr>
         <p:spPr>
           <a:xfrm>
-            <a:off x="3788517" y="1639927"/>
+            <a:off x="3788517" y="1752817"/>
             <a:ext cx="630622" cy="461665"/>
           </a:xfrm>
           <a:prstGeom prst="rect">
@@ -10452,7 +10443,7 @@
         </p:nvSpPr>
         <p:spPr>
           <a:xfrm>
-            <a:off x="5234631" y="1644013"/>
+            <a:off x="5234631" y="1756903"/>
             <a:ext cx="630622" cy="461665"/>
           </a:xfrm>
           <a:prstGeom prst="rect">
@@ -10494,7 +10485,7 @@
         </p:nvSpPr>
         <p:spPr>
           <a:xfrm>
-            <a:off x="1990313" y="1448814"/>
+            <a:off x="2046758" y="1561704"/>
             <a:ext cx="896646" cy="465149"/>
           </a:xfrm>
           <a:prstGeom prst="rect">
@@ -10558,8 +10549,8 @@
         </p:nvCxnSpPr>
         <p:spPr>
           <a:xfrm rot="16200000" flipV="1">
-            <a:off x="3152834" y="1415514"/>
-            <a:ext cx="391422" cy="923171"/>
+            <a:off x="3181056" y="1556627"/>
+            <a:ext cx="391422" cy="866726"/>
           </a:xfrm>
           <a:prstGeom prst="bentConnector2">
             <a:avLst/>
@@ -10606,8 +10597,8 @@
         </p:nvCxnSpPr>
         <p:spPr>
           <a:xfrm rot="5400000" flipH="1" flipV="1">
-            <a:off x="5547605" y="1406100"/>
-            <a:ext cx="386029" cy="942541"/>
+            <a:off x="5508094" y="1558501"/>
+            <a:ext cx="386029" cy="863518"/>
           </a:xfrm>
           <a:prstGeom prst="bentConnector2">
             <a:avLst/>
@@ -10650,7 +10641,7 @@
         </p:nvSpPr>
         <p:spPr>
           <a:xfrm>
-            <a:off x="6211890" y="1451780"/>
+            <a:off x="6132867" y="1564670"/>
             <a:ext cx="896646" cy="465149"/>
           </a:xfrm>
           <a:prstGeom prst="rect">
@@ -10710,7 +10701,7 @@
         </p:nvSpPr>
         <p:spPr>
           <a:xfrm>
-            <a:off x="6214715" y="2029380"/>
+            <a:off x="6135692" y="2142270"/>
             <a:ext cx="896646" cy="461639"/>
           </a:xfrm>
           <a:prstGeom prst="rect">
@@ -10777,8 +10768,8 @@
         </p:nvSpPr>
         <p:spPr>
           <a:xfrm>
-            <a:off x="300290" y="1548385"/>
-            <a:ext cx="1248114" cy="269256"/>
+            <a:off x="277712" y="1661275"/>
+            <a:ext cx="1423178" cy="269256"/>
           </a:xfrm>
           <a:prstGeom prst="roundRect">
             <a:avLst/>
@@ -10837,15 +10828,14 @@
           </p:cNvPr>
           <p:cNvCxnSpPr>
             <a:cxnSpLocks/>
-            <a:stCxn id="55" idx="1"/>
             <a:endCxn id="89" idx="3"/>
           </p:cNvCxnSpPr>
           <p:nvPr/>
         </p:nvCxnSpPr>
         <p:spPr>
           <a:xfrm rot="10800000" flipV="1">
-            <a:off x="1548405" y="1681389"/>
-            <a:ext cx="441909" cy="1624"/>
+            <a:off x="1700891" y="1794279"/>
+            <a:ext cx="266845" cy="1624"/>
           </a:xfrm>
           <a:prstGeom prst="bentConnector3">
             <a:avLst>
@@ -10895,8 +10885,8 @@
         </p:nvCxnSpPr>
         <p:spPr>
           <a:xfrm>
-            <a:off x="7108536" y="1684355"/>
-            <a:ext cx="467125" cy="5091"/>
+            <a:off x="7029513" y="1797245"/>
+            <a:ext cx="365524" cy="5091"/>
           </a:xfrm>
           <a:prstGeom prst="bentConnector3">
             <a:avLst>
@@ -10942,8 +10932,8 @@
         </p:nvSpPr>
         <p:spPr>
           <a:xfrm>
-            <a:off x="7575661" y="1508453"/>
-            <a:ext cx="1188941" cy="361986"/>
+            <a:off x="7395037" y="1621343"/>
+            <a:ext cx="1385325" cy="361986"/>
           </a:xfrm>
           <a:prstGeom prst="roundRect">
             <a:avLst/>
@@ -11018,7 +11008,7 @@
         </p:nvSpPr>
         <p:spPr>
           <a:xfrm>
-            <a:off x="268178" y="1914071"/>
+            <a:off x="245600" y="2026961"/>
             <a:ext cx="635110" cy="261610"/>
           </a:xfrm>
           <a:prstGeom prst="rect">
@@ -11065,7 +11055,7 @@
         </p:nvSpPr>
         <p:spPr>
           <a:xfrm>
-            <a:off x="251994" y="1339536"/>
+            <a:off x="229416" y="1452426"/>
             <a:ext cx="854864" cy="261610"/>
           </a:xfrm>
           <a:prstGeom prst="rect">
@@ -11112,7 +11102,7 @@
         </p:nvSpPr>
         <p:spPr>
           <a:xfrm>
-            <a:off x="251994" y="2415427"/>
+            <a:off x="229416" y="2528317"/>
             <a:ext cx="635110" cy="261610"/>
           </a:xfrm>
           <a:prstGeom prst="rect">
@@ -11159,7 +11149,7 @@
         </p:nvSpPr>
         <p:spPr>
           <a:xfrm>
-            <a:off x="7534794" y="2456340"/>
+            <a:off x="7354170" y="2569230"/>
             <a:ext cx="635110" cy="261610"/>
           </a:xfrm>
           <a:prstGeom prst="rect">
@@ -11206,7 +11196,7 @@
         </p:nvSpPr>
         <p:spPr>
           <a:xfrm>
-            <a:off x="7526733" y="1881703"/>
+            <a:off x="7346109" y="1994593"/>
             <a:ext cx="704860" cy="261610"/>
           </a:xfrm>
           <a:prstGeom prst="rect">
@@ -11253,7 +11243,7 @@
         </p:nvSpPr>
         <p:spPr>
           <a:xfrm>
-            <a:off x="7502457" y="1299076"/>
+            <a:off x="7321833" y="1411966"/>
             <a:ext cx="969850" cy="261610"/>
           </a:xfrm>
           <a:prstGeom prst="rect">
@@ -11300,7 +11290,7 @@
         </p:nvSpPr>
         <p:spPr>
           <a:xfrm>
-            <a:off x="7526732" y="3060670"/>
+            <a:off x="7346108" y="3173560"/>
             <a:ext cx="1230775" cy="261610"/>
           </a:xfrm>
           <a:prstGeom prst="rect">
@@ -11347,7 +11337,7 @@
         </p:nvSpPr>
         <p:spPr>
           <a:xfrm>
-            <a:off x="300290" y="4498336"/>
+            <a:off x="300290" y="4532203"/>
             <a:ext cx="4156460" cy="2308324"/>
           </a:xfrm>
           <a:prstGeom prst="rect">
@@ -11394,23 +11384,11 @@
           <a:p>
             <a:r>
               <a:rPr lang="en-US" sz="1400" b="1" dirty="0"/>
-              <a:t>  </a:t>
-            </a:r>
-            <a:r>
-              <a:rPr lang="en-US" sz="1400" b="1" dirty="0" err="1"/>
-              <a:t>val</a:t>
-            </a:r>
-            <a:r>
-              <a:rPr lang="en-US" sz="1400" b="1" dirty="0"/>
-              <a:t> </a:t>
-            </a:r>
-            <a:r>
-              <a:rPr lang="en-US" sz="1400" dirty="0" err="1"/>
-              <a:t>tid</a:t>
+              <a:t>  val </a:t>
             </a:r>
             <a:r>
               <a:rPr lang="en-US" sz="1400" dirty="0"/>
-              <a:t> = </a:t>
+              <a:t>tid = </a:t>
             </a:r>
             <a:r>
               <a:rPr lang="en-US" sz="1400" dirty="0" err="1"/>
@@ -11450,12 +11428,8 @@
               <a:t>  </a:t>
             </a:r>
             <a:r>
-              <a:rPr lang="en-US" sz="1400" b="1" dirty="0" err="1"/>
-              <a:t>val</a:t>
-            </a:r>
-            <a:r>
               <a:rPr lang="en-US" sz="1400" b="1" dirty="0"/>
-              <a:t> </a:t>
+              <a:t>val </a:t>
             </a:r>
             <a:r>
               <a:rPr lang="en-US" sz="1400" dirty="0" err="1"/>
@@ -11609,7 +11583,7 @@
         </p:nvSpPr>
         <p:spPr>
           <a:xfrm>
-            <a:off x="4622215" y="4498336"/>
+            <a:off x="4622215" y="4532203"/>
             <a:ext cx="4244027" cy="2241657"/>
           </a:xfrm>
           <a:prstGeom prst="rect">
@@ -11649,7 +11623,7 @@
               <a:t>  </a:t>
             </a:r>
             <a:r>
-              <a:rPr lang="en-US" sz="1400" b="1" dirty="0" err="1"/>
+              <a:rPr lang="en-US" sz="1400" b="1" dirty="0"/>
               <a:t>val</a:t>
             </a:r>
             <a:r>
@@ -11680,15 +11654,7 @@
           <a:p>
             <a:r>
               <a:rPr lang="en-US" sz="1400" b="1" dirty="0"/>
-              <a:t>  </a:t>
-            </a:r>
-            <a:r>
-              <a:rPr lang="en-US" sz="1400" b="1" dirty="0" err="1"/>
-              <a:t>val</a:t>
-            </a:r>
-            <a:r>
-              <a:rPr lang="en-US" sz="1400" b="1" dirty="0"/>
-              <a:t> </a:t>
+              <a:t>  val </a:t>
             </a:r>
             <a:r>
               <a:rPr lang="en-US" sz="1400" dirty="0" err="1"/>
@@ -11862,7 +11828,7 @@
         </p:nvSpPr>
         <p:spPr>
           <a:xfrm>
-            <a:off x="361436" y="4171495"/>
+            <a:off x="361436" y="4205362"/>
             <a:ext cx="980140" cy="338554"/>
           </a:xfrm>
           <a:prstGeom prst="rect">
@@ -11877,10 +11843,10 @@
           <a:lstStyle/>
           <a:p>
             <a:r>
-              <a:rPr lang="en-US" sz="1600" dirty="0" err="1"/>
+              <a:rPr lang="en-US" sz="1600" err="1"/>
               <a:t>buyOrder</a:t>
             </a:r>
-            <a:endParaRPr lang="ru-RU" sz="1600" dirty="0"/>
+            <a:endParaRPr lang="ru-RU" sz="1600"/>
           </a:p>
         </p:txBody>
       </p:sp>
@@ -11898,7 +11864,7 @@
         </p:nvSpPr>
         <p:spPr>
           <a:xfrm>
-            <a:off x="4613562" y="4189846"/>
+            <a:off x="4613562" y="4223713"/>
             <a:ext cx="948080" cy="338554"/>
           </a:xfrm>
           <a:prstGeom prst="rect">
@@ -11913,10 +11879,136 @@
           <a:lstStyle/>
           <a:p>
             <a:r>
-              <a:rPr lang="en-US" sz="1600" dirty="0" err="1"/>
+              <a:rPr lang="en-US" sz="1600" err="1"/>
               <a:t>sellOrder</a:t>
             </a:r>
-            <a:endParaRPr lang="ru-RU" sz="1600" dirty="0"/>
+            <a:endParaRPr lang="ru-RU" sz="1600"/>
+          </a:p>
+        </p:txBody>
+      </p:sp>
+      <p:sp>
+        <p:nvSpPr>
+          <p:cNvPr id="74" name="TextBox 73">
+            <a:extLst>
+              <a:ext uri="{FF2B5EF4-FFF2-40B4-BE49-F238E27FC236}">
+                <a16:creationId xmlns:a16="http://schemas.microsoft.com/office/drawing/2014/main" id="{247CA17B-4C87-2A43-B6AE-8FD8FCFB3C15}"/>
+              </a:ext>
+            </a:extLst>
+          </p:cNvPr>
+          <p:cNvSpPr txBox="1"/>
+          <p:nvPr/>
+        </p:nvSpPr>
+        <p:spPr>
+          <a:xfrm>
+            <a:off x="1327372" y="501145"/>
+            <a:ext cx="7427157" cy="338554"/>
+          </a:xfrm>
+          <a:prstGeom prst="rect">
+            <a:avLst/>
+          </a:prstGeom>
+          <a:noFill/>
+        </p:spPr>
+        <p:txBody>
+          <a:bodyPr wrap="square" rtlCol="0">
+            <a:spAutoFit/>
+          </a:bodyPr>
+          <a:lstStyle/>
+          <a:p>
+            <a:r>
+              <a:rPr lang="en-US" sz="1600" noProof="1">
+                <a:solidFill>
+                  <a:schemeClr val="tx1">
+                    <a:lumMod val="75000"/>
+                    <a:lumOff val="25000"/>
+                  </a:schemeClr>
+                </a:solidFill>
+              </a:rPr>
+              <a:t> </a:t>
+            </a:r>
+            <a:r>
+              <a:rPr lang="en-US" sz="1600" b="1" noProof="1">
+                <a:solidFill>
+                  <a:schemeClr val="tx1">
+                    <a:lumMod val="75000"/>
+                    <a:lumOff val="25000"/>
+                  </a:schemeClr>
+                </a:solidFill>
+              </a:rPr>
+              <a:t>flowcard</a:t>
+            </a:r>
+            <a:r>
+              <a:rPr lang="en-US" sz="1600" noProof="1">
+                <a:solidFill>
+                  <a:schemeClr val="tx1">
+                    <a:lumMod val="75000"/>
+                    <a:lumOff val="25000"/>
+                  </a:schemeClr>
+                </a:solidFill>
+              </a:rPr>
+              <a:t> DEX(buyer, seller: Address; TID: Token; ergAmt: ERG; tAmt: TID)</a:t>
+            </a:r>
+            <a:endParaRPr lang="ru-RU" sz="1600" noProof="1">
+              <a:solidFill>
+                <a:schemeClr val="tx1">
+                  <a:lumMod val="75000"/>
+                  <a:lumOff val="25000"/>
+                </a:schemeClr>
+              </a:solidFill>
+            </a:endParaRPr>
+          </a:p>
+        </p:txBody>
+      </p:sp>
+      <p:sp>
+        <p:nvSpPr>
+          <p:cNvPr id="75" name="Rounded Rectangle 74">
+            <a:extLst>
+              <a:ext uri="{FF2B5EF4-FFF2-40B4-BE49-F238E27FC236}">
+                <a16:creationId xmlns:a16="http://schemas.microsoft.com/office/drawing/2014/main" id="{2B1BEBF8-B05E-E149-8D82-28D391D3803A}"/>
+              </a:ext>
+            </a:extLst>
+          </p:cNvPr>
+          <p:cNvSpPr/>
+          <p:nvPr/>
+        </p:nvSpPr>
+        <p:spPr>
+          <a:xfrm>
+            <a:off x="96714" y="501146"/>
+            <a:ext cx="8956976" cy="3722568"/>
+          </a:xfrm>
+          <a:prstGeom prst="roundRect">
+            <a:avLst>
+              <a:gd name="adj" fmla="val 4550"/>
+            </a:avLst>
+          </a:prstGeom>
+          <a:noFill/>
+          <a:ln>
+            <a:solidFill>
+              <a:srgbClr val="FFA898"/>
+            </a:solidFill>
+          </a:ln>
+        </p:spPr>
+        <p:style>
+          <a:lnRef idx="2">
+            <a:schemeClr val="accent1">
+              <a:shade val="50000"/>
+            </a:schemeClr>
+          </a:lnRef>
+          <a:fillRef idx="1">
+            <a:schemeClr val="accent1"/>
+          </a:fillRef>
+          <a:effectRef idx="0">
+            <a:schemeClr val="accent1"/>
+          </a:effectRef>
+          <a:fontRef idx="minor">
+            <a:schemeClr val="lt1"/>
+          </a:fontRef>
+        </p:style>
+        <p:txBody>
+          <a:bodyPr rtlCol="0" anchor="ctr"/>
+          <a:lstStyle/>
+          <a:p>
+            <a:pPr algn="ctr"/>
+            <a:endParaRPr lang="ru-RU" sz="1400" noProof="1"/>
           </a:p>
         </p:txBody>
       </p:sp>

</xml_diff>